<commit_message>
UI-SJN-01-001U - 추가 수정
</commit_message>
<xml_diff>
--- a/ppt/03-16.pptx
+++ b/ppt/03-16.pptx
@@ -3046,7 +3046,7 @@
         </p:blipFill>
         <p:spPr>
           <a:xfrm>
-            <a:off x="5647929" y="816870"/>
+            <a:off x="5992702" y="816870"/>
             <a:ext cx="3211258" cy="4281677"/>
           </a:xfrm>
           <a:prstGeom prst="rect">
@@ -3062,7 +3062,7 @@
         </p:nvCxnSpPr>
         <p:spPr>
           <a:xfrm flipV="1">
-            <a:off x="6663128" y="4826834"/>
+            <a:off x="7007901" y="4826834"/>
             <a:ext cx="0" cy="577121"/>
           </a:xfrm>
           <a:prstGeom prst="straightConnector1">
@@ -3087,80 +3087,6 @@
           </a:fontRef>
         </p:style>
       </p:cxnSp>
-      <p:sp>
-        <p:nvSpPr>
-          <p:cNvPr id="11" name="TextBox 10"/>
-          <p:cNvSpPr txBox="1"/>
-          <p:nvPr/>
-        </p:nvSpPr>
-        <p:spPr>
-          <a:xfrm>
-            <a:off x="9086663" y="2221027"/>
-            <a:ext cx="2087431" cy="738664"/>
-          </a:xfrm>
-          <a:prstGeom prst="rect">
-            <a:avLst/>
-          </a:prstGeom>
-          <a:noFill/>
-        </p:spPr>
-        <p:txBody>
-          <a:bodyPr wrap="none" rtlCol="0">
-            <a:spAutoFit/>
-          </a:bodyPr>
-          <a:lstStyle/>
-          <a:p>
-            <a:r>
-              <a:rPr lang="ko-KR" altLang="en-US" sz="1400" dirty="0" smtClean="0"/>
-              <a:t>이미지는 </a:t>
-            </a:r>
-            <a:r>
-              <a:rPr lang="ko-KR" altLang="en-US" sz="1400" dirty="0" err="1" smtClean="0"/>
-              <a:t>클래스명</a:t>
-            </a:r>
-            <a:r>
-              <a:rPr lang="ko-KR" altLang="en-US" sz="1400" dirty="0" smtClean="0"/>
-              <a:t> </a:t>
-            </a:r>
-            <a:r>
-              <a:rPr lang="en-US" altLang="ko-KR" sz="1400" dirty="0" smtClean="0"/>
-              <a:t>img</a:t>
-            </a:r>
-          </a:p>
-          <a:p>
-            <a:r>
-              <a:rPr lang="ko-KR" altLang="en-US" sz="1400" dirty="0" smtClean="0"/>
-              <a:t>아이콘은 </a:t>
-            </a:r>
-            <a:r>
-              <a:rPr lang="ko-KR" altLang="en-US" sz="1400" dirty="0" err="1" smtClean="0"/>
-              <a:t>클래스면</a:t>
-            </a:r>
-            <a:r>
-              <a:rPr lang="ko-KR" altLang="en-US" sz="1400" dirty="0" smtClean="0"/>
-              <a:t> </a:t>
-            </a:r>
-            <a:r>
-              <a:rPr lang="en-US" altLang="ko-KR" sz="1400" dirty="0" smtClean="0"/>
-              <a:t>icon</a:t>
-            </a:r>
-          </a:p>
-          <a:p>
-            <a:r>
-              <a:rPr lang="ko-KR" altLang="en-US" sz="1400" dirty="0" err="1" smtClean="0"/>
-              <a:t>으로</a:t>
-            </a:r>
-            <a:r>
-              <a:rPr lang="ko-KR" altLang="en-US" sz="1400" dirty="0" smtClean="0"/>
-              <a:t> 사용해주세요</a:t>
-            </a:r>
-            <a:r>
-              <a:rPr lang="en-US" altLang="ko-KR" sz="1400" dirty="0" smtClean="0"/>
-              <a:t>.</a:t>
-            </a:r>
-            <a:endParaRPr lang="ko-KR" altLang="en-US" sz="1400" dirty="0"/>
-          </a:p>
-        </p:txBody>
-      </p:sp>
       <p:pic>
         <p:nvPicPr>
           <p:cNvPr id="12" name="그림 11"/>
@@ -3344,30 +3270,6 @@
           </a:p>
         </p:txBody>
       </p:sp>
-      <p:pic>
-        <p:nvPicPr>
-          <p:cNvPr id="19" name="그림 18"/>
-          <p:cNvPicPr>
-            <a:picLocks noChangeAspect="1"/>
-          </p:cNvPicPr>
-          <p:nvPr/>
-        </p:nvPicPr>
-        <p:blipFill>
-          <a:blip r:embed="rId4"/>
-          <a:stretch>
-            <a:fillRect/>
-          </a:stretch>
-        </p:blipFill>
-        <p:spPr>
-          <a:xfrm>
-            <a:off x="9854687" y="1210880"/>
-            <a:ext cx="1371791" cy="628738"/>
-          </a:xfrm>
-          <a:prstGeom prst="rect">
-            <a:avLst/>
-          </a:prstGeom>
-        </p:spPr>
-      </p:pic>
       <p:sp>
         <p:nvSpPr>
           <p:cNvPr id="20" name="TextBox 19"/>
@@ -3376,7 +3278,7 @@
         </p:nvSpPr>
         <p:spPr>
           <a:xfrm>
-            <a:off x="5864047" y="5645271"/>
+            <a:off x="6208820" y="5645271"/>
             <a:ext cx="3105337" cy="307777"/>
           </a:xfrm>
           <a:prstGeom prst="rect">

</xml_diff>